<commit_message>
WIP - pipelines slides
</commit_message>
<xml_diff>
--- a/04 - Machine Learning Pipelines/Machine-Learning-Pipelines.pptx
+++ b/04 - Machine Learning Pipelines/Machine-Learning-Pipelines.pptx
@@ -9432,6 +9432,12 @@
           <a:p>
             <a:r>
               <a:rPr lang="en-US" dirty="0"/>
+              <a:t>Data comes with fields or columns (if it’s even structured), not features</a:t>
+            </a:r>
+          </a:p>
+          <a:p>
+            <a:r>
+              <a:rPr lang="en-US" dirty="0"/>
               <a:t>Common Features</a:t>
             </a:r>
           </a:p>
@@ -9482,6 +9488,12 @@
             <a:r>
               <a:rPr lang="en-US" dirty="0"/>
               <a:t>Spatial</a:t>
+            </a:r>
+          </a:p>
+          <a:p>
+            <a:r>
+              <a:rPr lang="en-US" dirty="0"/>
+              <a:t>How are you handling imputation of missing values?</a:t>
             </a:r>
           </a:p>
           <a:p>
@@ -9778,6 +9790,12 @@
           <a:p>
             <a:r>
               <a:rPr lang="en-US" dirty="0"/>
+              <a:t>Model monitoring</a:t>
+            </a:r>
+          </a:p>
+          <a:p>
+            <a:r>
+              <a:rPr lang="en-US" dirty="0"/>
               <a:t>Re-training</a:t>
             </a:r>
           </a:p>
@@ -9988,12 +10006,21 @@
           <a:lstStyle/>
           <a:p>
             <a:r>
-              <a:rPr lang="en-US" dirty="0" err="1"/>
-              <a:t>Config</a:t>
-            </a:r>
-            <a:r>
-              <a:rPr lang="en-US" dirty="0"/>
-              <a:t> files (</a:t>
+              <a:rPr lang="en-US" dirty="0"/>
+              <a:t>Draw a diagram of the pipeline: </a:t>
+            </a:r>
+          </a:p>
+          <a:p>
+            <a:pPr lvl="1"/>
+            <a:r>
+              <a:rPr lang="en-US" dirty="0"/>
+              <a:t>What function runs each step? What are the inputs? What are the outputs?</a:t>
+            </a:r>
+          </a:p>
+          <a:p>
+            <a:r>
+              <a:rPr lang="en-US" dirty="0"/>
+              <a:t>Config files (</a:t>
             </a:r>
             <a:r>
               <a:rPr lang="en-US" dirty="0" err="1"/>
@@ -10001,15 +10028,7 @@
             </a:r>
             <a:r>
               <a:rPr lang="en-US" dirty="0"/>
-              <a:t>, </a:t>
-            </a:r>
-            <a:r>
-              <a:rPr lang="en-US" dirty="0" err="1"/>
-              <a:t>json</a:t>
-            </a:r>
-            <a:r>
-              <a:rPr lang="en-US" dirty="0"/>
-              <a:t>, </a:t>
+              <a:t>, json, </a:t>
             </a:r>
             <a:r>
               <a:rPr lang="en-US" dirty="0" err="1"/>
@@ -10023,22 +10042,44 @@
           <a:p>
             <a:r>
               <a:rPr lang="en-US" dirty="0"/>
+              <a:t>Make each step modular and extensible so it can easily be re-used</a:t>
+            </a:r>
+          </a:p>
+          <a:p>
+            <a:r>
+              <a:rPr lang="en-US" dirty="0"/>
+              <a:t>Build a simple, end-to-end version first, then add more functionality</a:t>
+            </a:r>
+          </a:p>
+          <a:p>
+            <a:r>
+              <a:rPr lang="en-US" dirty="0"/>
+              <a:t>Think about how you’ll store outputs:</a:t>
+            </a:r>
+          </a:p>
+          <a:p>
+            <a:pPr lvl="1"/>
+            <a:r>
+              <a:rPr lang="en-US" dirty="0"/>
               <a:t>Store models as pickles</a:t>
             </a:r>
           </a:p>
           <a:p>
+            <a:pPr lvl="1"/>
             <a:r>
               <a:rPr lang="en-US" dirty="0"/>
               <a:t>Store predictions in databases</a:t>
             </a:r>
           </a:p>
           <a:p>
+            <a:pPr lvl="1"/>
             <a:r>
               <a:rPr lang="en-US" dirty="0"/>
               <a:t>Store evaluation metrics in databases</a:t>
             </a:r>
           </a:p>
           <a:p>
+            <a:pPr lvl="1"/>
             <a:r>
               <a:rPr lang="en-US" dirty="0">
                 <a:hlinkClick r:id="rId2"/>
@@ -11295,7 +11336,7 @@
             <a:pPr lvl="1"/>
             <a:r>
               <a:rPr lang="en-US" dirty="0"/>
-              <a:t>Testing ideas and hypothesis easily and quickly</a:t>
+              <a:t>Testing ideas and hypotheses easily and quickly</a:t>
             </a:r>
           </a:p>
           <a:p>

</xml_diff>

<commit_message>
public repo link for example config
</commit_message>
<xml_diff>
--- a/04 - Machine Learning Pipelines/Machine-Learning-Pipelines.pptx
+++ b/04 - Machine Learning Pipelines/Machine-Learning-Pipelines.pptx
@@ -269,7 +269,7 @@
       <p15:sldGuideLst xmlns:p15="http://schemas.microsoft.com/office/powerpoint/2012/main"/>
     </p:ext>
     <p:ext uri="http://customooxmlschemas.google.com/">
-      <go:slidesCustomData xmlns:go="http://customooxmlschemas.google.com/" xmlns:p15="http://schemas.microsoft.com/office/powerpoint/2012/main" xmlns:p14="http://schemas.microsoft.com/office/powerpoint/2010/main" xmlns:com="http://schemas.openxmlformats.org/drawingml/2006/compatibility" xmlns:pvml="urn:schemas-microsoft-com:office:powerpoint" xmlns:v="urn:schemas-microsoft-com:vml" xmlns:o="urn:schemas-microsoft-com:office:office" xmlns:dgm="http://schemas.openxmlformats.org/drawingml/2006/diagram" xmlns:c="http://schemas.openxmlformats.org/drawingml/2006/chart" xmlns:mv="urn:schemas-microsoft-com:mac:vml" xmlns:mc="http://schemas.openxmlformats.org/markup-compatibility/2006" xmlns="" r:id="rId30" roundtripDataSignature="AMtx7mjFyVUGRZWio+dc9dxzYsimUxNJbg=="/>
+      <go:slidesCustomData xmlns="" xmlns:mc="http://schemas.openxmlformats.org/markup-compatibility/2006" xmlns:mv="urn:schemas-microsoft-com:mac:vml" xmlns:c="http://schemas.openxmlformats.org/drawingml/2006/chart" xmlns:dgm="http://schemas.openxmlformats.org/drawingml/2006/diagram" xmlns:o="urn:schemas-microsoft-com:office:office" xmlns:v="urn:schemas-microsoft-com:vml" xmlns:pvml="urn:schemas-microsoft-com:office:powerpoint" xmlns:com="http://schemas.openxmlformats.org/drawingml/2006/compatibility" xmlns:p14="http://schemas.microsoft.com/office/powerpoint/2010/main" xmlns:p15="http://schemas.microsoft.com/office/powerpoint/2012/main" xmlns:go="http://customooxmlschemas.google.com/" r:id="rId30" roundtripDataSignature="AMtx7mjFyVUGRZWio+dc9dxzYsimUxNJbg=="/>
     </p:ext>
   </p:extLst>
 </p:presentation>
@@ -15299,37 +15299,34 @@
           <a:lstStyle/>
           <a:p>
             <a:r>
+              <a:rPr lang="en-US" dirty="0">
+                <a:hlinkClick r:id="rId2"/>
+              </a:rPr>
+              <a:t>https://github.com/dssg/san_jose_housing/blob/master/example_experiment_config.yaml</a:t>
+            </a:r>
+            <a:r>
               <a:rPr lang="en-US" dirty="0"/>
-              <a:t>https://</a:t>
-            </a:r>
-            <a:r>
-              <a:rPr lang="en-US" dirty="0" err="1"/>
-              <a:t>github.com</a:t>
-            </a:r>
-            <a:r>
+              <a:t> (San Jose Housing – Private Repo)</a:t>
+            </a:r>
+            <a:br>
               <a:rPr lang="en-US" dirty="0"/>
-              <a:t>/</a:t>
-            </a:r>
-            <a:r>
-              <a:rPr lang="en-US" dirty="0" err="1"/>
-              <a:t>dssg</a:t>
+            </a:br>
+            <a:endParaRPr lang="en-US" dirty="0"/>
+          </a:p>
+          <a:p>
+            <a:r>
+              <a:rPr lang="en-US" dirty="0">
+                <a:hlinkClick r:id="rId3"/>
+              </a:rPr>
+              <a:t>https://github.com/dssg/direccion_trabajo_inspections/blob/master/experiments/test.yaml</a:t>
             </a:r>
             <a:r>
               <a:rPr lang="en-US" dirty="0"/>
-              <a:t>/</a:t>
-            </a:r>
-            <a:r>
-              <a:rPr lang="en-US" dirty="0" err="1"/>
-              <a:t>san_jose_housing</a:t>
-            </a:r>
-            <a:r>
+              <a:t> (Chile Workplace Inspections - Public Repo)</a:t>
+            </a:r>
+            <a:br>
               <a:rPr lang="en-US" dirty="0"/>
-              <a:t>/blob/master/</a:t>
-            </a:r>
-            <a:r>
-              <a:rPr lang="en-US" dirty="0" err="1"/>
-              <a:t>example_experiment_config.yaml</a:t>
-            </a:r>
+            </a:br>
             <a:endParaRPr lang="en-US" dirty="0"/>
           </a:p>
         </p:txBody>

</xml_diff>